<commit_message>
Added more to knn slide
</commit_message>
<xml_diff>
--- a/FinalPresentation_v1.pptx
+++ b/FinalPresentation_v1.pptx
@@ -1433,7 +1433,7 @@
           <a:bodyPr lIns="0" rIns="0" tIns="0" bIns="0"/>
           <a:p>
             <a:pPr algn="r"/>
-            <a:fld id="{507C3AC4-BF6A-4465-96A8-7442526E5E4D}" type="slidenum">
+            <a:fld id="{2A7DB653-5AAB-4466-B5CF-CE572C48E07E}" type="slidenum">
               <a:rPr lang="en-US" sz="1400">
                 <a:latin typeface="Times New Roman"/>
               </a:rPr>
@@ -2172,7 +2172,7 @@
         </p:nvSpPr>
         <p:spPr>
           <a:xfrm>
-            <a:off x="504000" y="1769040"/>
+            <a:off x="504000" y="1650600"/>
             <a:ext cx="9071640" cy="4384440"/>
           </a:xfrm>
           <a:prstGeom prst="rect">
@@ -2199,6 +2199,34 @@
             </a:r>
             <a:endParaRPr/>
           </a:p>
+          <a:p>
+            <a:pPr>
+              <a:buSzPct val="45000"/>
+              <a:buFont typeface="StarSymbol"/>
+              <a:buChar char=""/>
+            </a:pPr>
+            <a:r>
+              <a:rPr lang="en-US" sz="3200">
+                <a:latin typeface="Arial"/>
+              </a:rPr>
+              <a:t>Classification: Divide data into classes/families</a:t>
+            </a:r>
+            <a:endParaRPr/>
+          </a:p>
+          <a:p>
+            <a:pPr>
+              <a:buSzPct val="45000"/>
+              <a:buFont typeface="StarSymbol"/>
+              <a:buChar char=""/>
+            </a:pPr>
+            <a:r>
+              <a:rPr lang="en-US" sz="3200">
+                <a:latin typeface="Arial"/>
+              </a:rPr>
+              <a:t>New-comer: highest total weights of k nearest neighbours gives class to new comer</a:t>
+            </a:r>
+            <a:endParaRPr/>
+          </a:p>
         </p:txBody>
       </p:sp>
       <p:sp>
@@ -2246,8 +2274,8 @@
         </p:blipFill>
         <p:spPr>
           <a:xfrm>
-            <a:off x="1577520" y="3416400"/>
-            <a:ext cx="2095200" cy="1895040"/>
+            <a:off x="605520" y="4316400"/>
+            <a:ext cx="3335040" cy="2934720"/>
           </a:xfrm>
           <a:prstGeom prst="rect">
             <a:avLst/>
@@ -2269,8 +2297,8 @@
         </p:blipFill>
         <p:spPr>
           <a:xfrm>
-            <a:off x="4760640" y="2941920"/>
-            <a:ext cx="3742920" cy="2990520"/>
+            <a:off x="4760640" y="3912480"/>
+            <a:ext cx="5114880" cy="3474720"/>
           </a:xfrm>
           <a:prstGeom prst="rect">
             <a:avLst/>
@@ -2410,6 +2438,33 @@
       </p:pic>
     </p:spTree>
   </p:cSld>
+  <p:timing>
+    <p:tnLst>
+      <p:par>
+        <p:cTn id="13" dur="indefinite" restart="never" nodeType="tmRoot">
+          <p:childTnLst>
+            <p:seq>
+              <p:cTn id="14" nodeType="mainSeq"/>
+              <p:prevCondLst>
+                <p:cond delay="0" evt="onPrev">
+                  <p:tgtEl>
+                    <p:sldTgt/>
+                  </p:tgtEl>
+                </p:cond>
+              </p:prevCondLst>
+              <p:nextCondLst>
+                <p:cond delay="0" evt="onNext">
+                  <p:tgtEl>
+                    <p:sldTgt/>
+                  </p:tgtEl>
+                </p:cond>
+              </p:nextCondLst>
+            </p:seq>
+          </p:childTnLst>
+        </p:cTn>
+      </p:par>
+    </p:tnLst>
+  </p:timing>
 </p:sld>
 </file>
 
@@ -2495,6 +2550,33 @@
       </p:sp>
     </p:spTree>
   </p:cSld>
+  <p:timing>
+    <p:tnLst>
+      <p:par>
+        <p:cTn id="15" dur="indefinite" restart="never" nodeType="tmRoot">
+          <p:childTnLst>
+            <p:seq>
+              <p:cTn id="16" nodeType="mainSeq"/>
+              <p:prevCondLst>
+                <p:cond delay="0" evt="onPrev">
+                  <p:tgtEl>
+                    <p:sldTgt/>
+                  </p:tgtEl>
+                </p:cond>
+              </p:prevCondLst>
+              <p:nextCondLst>
+                <p:cond delay="0" evt="onNext">
+                  <p:tgtEl>
+                    <p:sldTgt/>
+                  </p:tgtEl>
+                </p:cond>
+              </p:nextCondLst>
+            </p:seq>
+          </p:childTnLst>
+        </p:cTn>
+      </p:par>
+    </p:tnLst>
+  </p:timing>
 </p:sld>
 </file>
 
@@ -2570,6 +2652,33 @@
       </p:sp>
     </p:spTree>
   </p:cSld>
+  <p:timing>
+    <p:tnLst>
+      <p:par>
+        <p:cTn id="17" dur="indefinite" restart="never" nodeType="tmRoot">
+          <p:childTnLst>
+            <p:seq>
+              <p:cTn id="18" nodeType="mainSeq"/>
+              <p:prevCondLst>
+                <p:cond delay="0" evt="onPrev">
+                  <p:tgtEl>
+                    <p:sldTgt/>
+                  </p:tgtEl>
+                </p:cond>
+              </p:prevCondLst>
+              <p:nextCondLst>
+                <p:cond delay="0" evt="onNext">
+                  <p:tgtEl>
+                    <p:sldTgt/>
+                  </p:tgtEl>
+                </p:cond>
+              </p:nextCondLst>
+            </p:seq>
+          </p:childTnLst>
+        </p:cTn>
+      </p:par>
+    </p:tnLst>
+  </p:timing>
 </p:sld>
 </file>
 

</xml_diff>